<commit_message>
update week 03 and lab 02
</commit_message>
<xml_diff>
--- a/docs/Lectures/Week02/Week02_InferentialStas.pptx
+++ b/docs/Lectures/Week02/Week02_InferentialStas.pptx
@@ -27,8 +27,6 @@
     <p:sldId id="857" r:id="rId21"/>
     <p:sldId id="856" r:id="rId22"/>
     <p:sldId id="265" r:id="rId23"/>
-    <p:sldId id="328" r:id="rId24"/>
-    <p:sldId id="858" r:id="rId25"/>
   </p:sldIdLst>
   <p:sldSz cx="12192000" cy="6858000"/>
   <p:notesSz cx="6858000" cy="9144000"/>
@@ -373,7 +371,7 @@
           <a:p>
             <a:fld id="{ED291B17-9318-49DB-B28B-6E5994AE9581}" type="datetime1">
               <a:rPr lang="en-US" smtClean="0"/>
-              <a:t>1/6/2025</a:t>
+              <a:t>1/8/2025</a:t>
             </a:fld>
             <a:endParaRPr lang="en-US" dirty="0"/>
           </a:p>
@@ -576,7 +574,7 @@
           <a:p>
             <a:fld id="{2CED4963-E985-44C4-B8C4-FDD613B7C2F8}" type="datetime1">
               <a:rPr lang="en-US" smtClean="0"/>
-              <a:t>1/6/2025</a:t>
+              <a:t>1/8/2025</a:t>
             </a:fld>
             <a:endParaRPr lang="en-US" dirty="0"/>
           </a:p>
@@ -938,7 +936,7 @@
           <a:p>
             <a:fld id="{ED291B17-9318-49DB-B28B-6E5994AE9581}" type="datetime1">
               <a:rPr lang="en-US" smtClean="0"/>
-              <a:t>1/6/2025</a:t>
+              <a:t>1/8/2025</a:t>
             </a:fld>
             <a:endParaRPr lang="en-US" dirty="0"/>
           </a:p>
@@ -1248,7 +1246,7 @@
           <a:p>
             <a:fld id="{ED291B17-9318-49DB-B28B-6E5994AE9581}" type="datetime1">
               <a:rPr lang="en-US" smtClean="0"/>
-              <a:t>1/6/2025</a:t>
+              <a:t>1/8/2025</a:t>
             </a:fld>
             <a:endParaRPr lang="en-US" dirty="0"/>
           </a:p>
@@ -1445,7 +1443,7 @@
           <a:p>
             <a:fld id="{78DD82B9-B8EE-4375-B6FF-88FA6ABB15D9}" type="datetime1">
               <a:rPr lang="en-US" smtClean="0"/>
-              <a:t>1/6/2025</a:t>
+              <a:t>1/8/2025</a:t>
             </a:fld>
             <a:endParaRPr lang="en-US" dirty="0"/>
           </a:p>
@@ -1756,7 +1754,7 @@
           <a:p>
             <a:fld id="{B2497495-0637-405E-AE64-5CC7506D51F5}" type="datetime1">
               <a:rPr lang="en-US" smtClean="0"/>
-              <a:t>1/6/2025</a:t>
+              <a:t>1/8/2025</a:t>
             </a:fld>
             <a:endParaRPr lang="en-US" dirty="0"/>
           </a:p>
@@ -2009,7 +2007,7 @@
           <a:p>
             <a:fld id="{7BFFD690-9426-415D-8B65-26881E07B2D4}" type="datetime1">
               <a:rPr lang="en-US" smtClean="0"/>
-              <a:t>1/6/2025</a:t>
+              <a:t>1/8/2025</a:t>
             </a:fld>
             <a:endParaRPr lang="en-US" dirty="0"/>
           </a:p>
@@ -2431,7 +2429,7 @@
           <a:p>
             <a:fld id="{04C4989A-474C-40DE-95B9-011C28B71673}" type="datetime1">
               <a:rPr lang="en-US" smtClean="0"/>
-              <a:t>1/6/2025</a:t>
+              <a:t>1/8/2025</a:t>
             </a:fld>
             <a:endParaRPr lang="en-US" dirty="0"/>
           </a:p>
@@ -2554,7 +2552,7 @@
           <a:p>
             <a:fld id="{5DB4ED54-5B5E-4A04-93D3-5772E3CE3818}" type="datetime1">
               <a:rPr lang="en-US" smtClean="0"/>
-              <a:t>1/6/2025</a:t>
+              <a:t>1/8/2025</a:t>
             </a:fld>
             <a:endParaRPr lang="en-US" dirty="0"/>
           </a:p>
@@ -2649,7 +2647,7 @@
           <a:p>
             <a:fld id="{4EDE50D6-574B-40AF-946F-D52A04ADE379}" type="datetime1">
               <a:rPr lang="en-US" smtClean="0"/>
-              <a:t>1/6/2025</a:t>
+              <a:t>1/8/2025</a:t>
             </a:fld>
             <a:endParaRPr lang="en-US" dirty="0"/>
           </a:p>
@@ -3025,7 +3023,7 @@
           <a:p>
             <a:fld id="{D82884F1-FFEA-405F-9602-3DCA865EDA4E}" type="datetime1">
               <a:rPr lang="en-US" smtClean="0"/>
-              <a:t>1/6/2025</a:t>
+              <a:t>1/8/2025</a:t>
             </a:fld>
             <a:endParaRPr lang="en-US" dirty="0"/>
           </a:p>
@@ -3232,7 +3230,7 @@
           <a:p>
             <a:fld id="{78DD82B9-B8EE-4375-B6FF-88FA6ABB15D9}" type="datetime1">
               <a:rPr lang="en-US" smtClean="0"/>
-              <a:t>1/6/2025</a:t>
+              <a:t>1/8/2025</a:t>
             </a:fld>
             <a:endParaRPr lang="en-US" dirty="0"/>
           </a:p>
@@ -3514,7 +3512,7 @@
           <a:p>
             <a:fld id="{7E18DB4A-8810-4A10-AD5C-D5E2C667F5B3}" type="datetime1">
               <a:rPr lang="en-US" smtClean="0"/>
-              <a:t>1/6/2025</a:t>
+              <a:t>1/8/2025</a:t>
             </a:fld>
             <a:endParaRPr lang="en-US" dirty="0"/>
           </a:p>
@@ -3706,7 +3704,7 @@
           <a:p>
             <a:fld id="{2CED4963-E985-44C4-B8C4-FDD613B7C2F8}" type="datetime1">
               <a:rPr lang="en-US" smtClean="0"/>
-              <a:t>1/6/2025</a:t>
+              <a:t>1/8/2025</a:t>
             </a:fld>
             <a:endParaRPr lang="en-US" dirty="0"/>
           </a:p>
@@ -4068,7 +4066,7 @@
           <a:p>
             <a:fld id="{ED291B17-9318-49DB-B28B-6E5994AE9581}" type="datetime1">
               <a:rPr lang="en-US" smtClean="0"/>
-              <a:t>1/6/2025</a:t>
+              <a:t>1/8/2025</a:t>
             </a:fld>
             <a:endParaRPr lang="en-US" dirty="0"/>
           </a:p>
@@ -4544,7 +4542,7 @@
           <a:p>
             <a:fld id="{B2497495-0637-405E-AE64-5CC7506D51F5}" type="datetime1">
               <a:rPr lang="en-US" smtClean="0"/>
-              <a:t>1/6/2025</a:t>
+              <a:t>1/8/2025</a:t>
             </a:fld>
             <a:endParaRPr lang="en-US" dirty="0"/>
           </a:p>
@@ -4795,7 +4793,7 @@
           <a:p>
             <a:fld id="{7BFFD690-9426-415D-8B65-26881E07B2D4}" type="datetime1">
               <a:rPr lang="en-US" smtClean="0"/>
-              <a:t>1/6/2025</a:t>
+              <a:t>1/8/2025</a:t>
             </a:fld>
             <a:endParaRPr lang="en-US" dirty="0"/>
           </a:p>
@@ -5216,7 +5214,7 @@
           <a:p>
             <a:fld id="{04C4989A-474C-40DE-95B9-011C28B71673}" type="datetime1">
               <a:rPr lang="en-US" smtClean="0"/>
-              <a:t>1/6/2025</a:t>
+              <a:t>1/8/2025</a:t>
             </a:fld>
             <a:endParaRPr lang="en-US" dirty="0"/>
           </a:p>
@@ -5339,7 +5337,7 @@
           <a:p>
             <a:fld id="{5DB4ED54-5B5E-4A04-93D3-5772E3CE3818}" type="datetime1">
               <a:rPr lang="en-US" smtClean="0"/>
-              <a:t>1/6/2025</a:t>
+              <a:t>1/8/2025</a:t>
             </a:fld>
             <a:endParaRPr lang="en-US" dirty="0"/>
           </a:p>
@@ -5434,7 +5432,7 @@
           <a:p>
             <a:fld id="{4EDE50D6-574B-40AF-946F-D52A04ADE379}" type="datetime1">
               <a:rPr lang="en-US" smtClean="0"/>
-              <a:t>1/6/2025</a:t>
+              <a:t>1/8/2025</a:t>
             </a:fld>
             <a:endParaRPr lang="en-US" dirty="0"/>
           </a:p>
@@ -5810,7 +5808,7 @@
           <a:p>
             <a:fld id="{D82884F1-FFEA-405F-9602-3DCA865EDA4E}" type="datetime1">
               <a:rPr lang="en-US" smtClean="0"/>
-              <a:t>1/6/2025</a:t>
+              <a:t>1/8/2025</a:t>
             </a:fld>
             <a:endParaRPr lang="en-US" dirty="0"/>
           </a:p>
@@ -6103,7 +6101,7 @@
           <a:p>
             <a:fld id="{7E18DB4A-8810-4A10-AD5C-D5E2C667F5B3}" type="datetime1">
               <a:rPr lang="en-US" smtClean="0"/>
-              <a:t>1/6/2025</a:t>
+              <a:t>1/8/2025</a:t>
             </a:fld>
             <a:endParaRPr lang="en-US" dirty="0"/>
           </a:p>
@@ -6318,7 +6316,7 @@
           <a:p>
             <a:fld id="{ED291B17-9318-49DB-B28B-6E5994AE9581}" type="datetime1">
               <a:rPr lang="en-US" smtClean="0"/>
-              <a:t>1/6/2025</a:t>
+              <a:t>1/8/2025</a:t>
             </a:fld>
             <a:endParaRPr lang="en-US" dirty="0"/>
           </a:p>
@@ -7097,7 +7095,7 @@
           <a:p>
             <a:fld id="{ED291B17-9318-49DB-B28B-6E5994AE9581}" type="datetime1">
               <a:rPr lang="en-US" smtClean="0"/>
-              <a:t>1/6/2025</a:t>
+              <a:t>1/8/2025</a:t>
             </a:fld>
             <a:endParaRPr lang="en-US" dirty="0"/>
           </a:p>
@@ -13994,884 +13992,6 @@
     <p:extLst>
       <p:ext uri="{BB962C8B-B14F-4D97-AF65-F5344CB8AC3E}">
         <p14:creationId xmlns:p14="http://schemas.microsoft.com/office/powerpoint/2010/main" val="121643133"/>
-      </p:ext>
-    </p:extLst>
-  </p:cSld>
-  <p:clrMapOvr>
-    <a:masterClrMapping/>
-  </p:clrMapOvr>
-</p:sld>
-</file>
-
-<file path=ppt/slides/slide22.xml><?xml version="1.0" encoding="utf-8"?>
-<p:sld xmlns:a="http://schemas.openxmlformats.org/drawingml/2006/main" xmlns:r="http://schemas.openxmlformats.org/officeDocument/2006/relationships" xmlns:p="http://schemas.openxmlformats.org/presentationml/2006/main">
-  <p:cSld>
-    <p:bg>
-      <p:bgPr>
-        <a:solidFill>
-          <a:schemeClr val="bg1"/>
-        </a:solidFill>
-        <a:effectLst/>
-      </p:bgPr>
-    </p:bg>
-    <p:spTree>
-      <p:nvGrpSpPr>
-        <p:cNvPr id="1" name="">
-          <a:extLst>
-            <a:ext uri="{FF2B5EF4-FFF2-40B4-BE49-F238E27FC236}">
-              <a16:creationId xmlns:a16="http://schemas.microsoft.com/office/drawing/2014/main" id="{7CF76537-05AE-301D-CEB2-297013921104}"/>
-            </a:ext>
-          </a:extLst>
-        </p:cNvPr>
-        <p:cNvGrpSpPr/>
-        <p:nvPr/>
-      </p:nvGrpSpPr>
-      <p:grpSpPr>
-        <a:xfrm>
-          <a:off x="0" y="0"/>
-          <a:ext cx="0" cy="0"/>
-          <a:chOff x="0" y="0"/>
-          <a:chExt cx="0" cy="0"/>
-        </a:xfrm>
-      </p:grpSpPr>
-      <p:sp>
-        <p:nvSpPr>
-          <p:cNvPr id="55" name="Rectangle 54">
-            <a:extLst>
-              <a:ext uri="{FF2B5EF4-FFF2-40B4-BE49-F238E27FC236}">
-                <a16:creationId xmlns:a16="http://schemas.microsoft.com/office/drawing/2014/main" id="{DCF4EB5C-ED25-4675-8255-2F5B12CFFCF0}"/>
-              </a:ext>
-              <a:ext uri="{C183D7F6-B498-43B3-948B-1728B52AA6E4}">
-                <adec:decorative xmlns:adec="http://schemas.microsoft.com/office/drawing/2017/decorative" val="1"/>
-              </a:ext>
-            </a:extLst>
-          </p:cNvPr>
-          <p:cNvSpPr>
-            <a:spLocks noGrp="1" noRot="1" noChangeAspect="1" noMove="1" noResize="1" noEditPoints="1" noAdjustHandles="1" noChangeArrowheads="1" noChangeShapeType="1" noTextEdit="1"/>
-          </p:cNvSpPr>
-          <p:nvPr>
-            <p:extLst>
-              <p:ext uri="{386F3935-93C4-4BCD-93E2-E3B085C9AB24}">
-                <p16:designElem xmlns:p16="http://schemas.microsoft.com/office/powerpoint/2015/main" val="1"/>
-              </p:ext>
-            </p:extLst>
-          </p:nvPr>
-        </p:nvSpPr>
-        <p:spPr>
-          <a:xfrm>
-            <a:off x="446534" y="457200"/>
-            <a:ext cx="3703320" cy="94997"/>
-          </a:xfrm>
-          <a:prstGeom prst="rect">
-            <a:avLst/>
-          </a:prstGeom>
-          <a:solidFill>
-            <a:srgbClr val="465359"/>
-          </a:solidFill>
-          <a:ln>
-            <a:noFill/>
-          </a:ln>
-          <a:effectLst/>
-        </p:spPr>
-        <p:style>
-          <a:lnRef idx="1">
-            <a:schemeClr val="accent1"/>
-          </a:lnRef>
-          <a:fillRef idx="3">
-            <a:schemeClr val="accent1"/>
-          </a:fillRef>
-          <a:effectRef idx="2">
-            <a:schemeClr val="accent1"/>
-          </a:effectRef>
-          <a:fontRef idx="minor">
-            <a:schemeClr val="lt1"/>
-          </a:fontRef>
-        </p:style>
-        <p:txBody>
-          <a:bodyPr/>
-          <a:lstStyle/>
-          <a:p>
-            <a:pPr marL="0" marR="0" lvl="0" indent="0" algn="l" defTabSz="457200" rtl="0" eaLnBrk="1" fontAlgn="auto" latinLnBrk="0" hangingPunct="1">
-              <a:lnSpc>
-                <a:spcPct val="100000"/>
-              </a:lnSpc>
-              <a:spcBef>
-                <a:spcPts val="0"/>
-              </a:spcBef>
-              <a:spcAft>
-                <a:spcPts val="0"/>
-              </a:spcAft>
-              <a:buClrTx/>
-              <a:buSzTx/>
-              <a:buFontTx/>
-              <a:buNone/>
-              <a:tabLst/>
-              <a:defRPr/>
-            </a:pPr>
-            <a:endParaRPr kumimoji="0" lang="en-US" sz="1800" b="0" i="0" u="none" strike="noStrike" kern="1200" cap="none" spc="0" normalizeH="0" baseline="0" noProof="0">
-              <a:ln>
-                <a:noFill/>
-              </a:ln>
-              <a:solidFill>
-                <a:srgbClr val="FFFFFF"/>
-              </a:solidFill>
-              <a:effectLst/>
-              <a:uLnTx/>
-              <a:uFillTx/>
-              <a:latin typeface="Calibri"/>
-              <a:ea typeface="+mn-ea"/>
-              <a:cs typeface="+mn-cs"/>
-            </a:endParaRPr>
-          </a:p>
-        </p:txBody>
-      </p:sp>
-      <p:sp>
-        <p:nvSpPr>
-          <p:cNvPr id="57" name="Rectangle 56">
-            <a:extLst>
-              <a:ext uri="{FF2B5EF4-FFF2-40B4-BE49-F238E27FC236}">
-                <a16:creationId xmlns:a16="http://schemas.microsoft.com/office/drawing/2014/main" id="{9514EC6E-A557-42A2-BCDC-3ABFFC5E564D}"/>
-              </a:ext>
-              <a:ext uri="{C183D7F6-B498-43B3-948B-1728B52AA6E4}">
-                <adec:decorative xmlns:adec="http://schemas.microsoft.com/office/drawing/2017/decorative" val="1"/>
-              </a:ext>
-            </a:extLst>
-          </p:cNvPr>
-          <p:cNvSpPr>
-            <a:spLocks noGrp="1" noRot="1" noChangeAspect="1" noMove="1" noResize="1" noEditPoints="1" noAdjustHandles="1" noChangeArrowheads="1" noChangeShapeType="1" noTextEdit="1"/>
-          </p:cNvSpPr>
-          <p:nvPr>
-            <p:extLst>
-              <p:ext uri="{386F3935-93C4-4BCD-93E2-E3B085C9AB24}">
-                <p16:designElem xmlns:p16="http://schemas.microsoft.com/office/powerpoint/2015/main" val="1"/>
-              </p:ext>
-            </p:extLst>
-          </p:nvPr>
-        </p:nvSpPr>
-        <p:spPr>
-          <a:xfrm>
-            <a:off x="8042147" y="453643"/>
-            <a:ext cx="3703320" cy="98554"/>
-          </a:xfrm>
-          <a:prstGeom prst="rect">
-            <a:avLst/>
-          </a:prstGeom>
-          <a:solidFill>
-            <a:srgbClr val="969FA7"/>
-          </a:solidFill>
-          <a:ln>
-            <a:noFill/>
-          </a:ln>
-          <a:effectLst/>
-        </p:spPr>
-        <p:style>
-          <a:lnRef idx="1">
-            <a:schemeClr val="accent1"/>
-          </a:lnRef>
-          <a:fillRef idx="3">
-            <a:schemeClr val="accent1"/>
-          </a:fillRef>
-          <a:effectRef idx="2">
-            <a:schemeClr val="accent1"/>
-          </a:effectRef>
-          <a:fontRef idx="minor">
-            <a:schemeClr val="lt1"/>
-          </a:fontRef>
-        </p:style>
-        <p:txBody>
-          <a:bodyPr/>
-          <a:lstStyle/>
-          <a:p>
-            <a:pPr marL="0" marR="0" lvl="0" indent="0" algn="l" defTabSz="457200" rtl="0" eaLnBrk="1" fontAlgn="auto" latinLnBrk="0" hangingPunct="1">
-              <a:lnSpc>
-                <a:spcPct val="100000"/>
-              </a:lnSpc>
-              <a:spcBef>
-                <a:spcPts val="0"/>
-              </a:spcBef>
-              <a:spcAft>
-                <a:spcPts val="0"/>
-              </a:spcAft>
-              <a:buClrTx/>
-              <a:buSzTx/>
-              <a:buFontTx/>
-              <a:buNone/>
-              <a:tabLst/>
-              <a:defRPr/>
-            </a:pPr>
-            <a:endParaRPr kumimoji="0" lang="en-US" sz="1800" b="0" i="0" u="none" strike="noStrike" kern="1200" cap="none" spc="0" normalizeH="0" baseline="0" noProof="0">
-              <a:ln>
-                <a:noFill/>
-              </a:ln>
-              <a:solidFill>
-                <a:srgbClr val="FFFFFF"/>
-              </a:solidFill>
-              <a:effectLst/>
-              <a:uLnTx/>
-              <a:uFillTx/>
-              <a:latin typeface="Calibri"/>
-              <a:ea typeface="+mn-ea"/>
-              <a:cs typeface="+mn-cs"/>
-            </a:endParaRPr>
-          </a:p>
-        </p:txBody>
-      </p:sp>
-      <p:sp>
-        <p:nvSpPr>
-          <p:cNvPr id="59" name="Rectangle 58">
-            <a:extLst>
-              <a:ext uri="{FF2B5EF4-FFF2-40B4-BE49-F238E27FC236}">
-                <a16:creationId xmlns:a16="http://schemas.microsoft.com/office/drawing/2014/main" id="{905482C9-EB42-4BFE-95BF-7FD661F07657}"/>
-              </a:ext>
-              <a:ext uri="{C183D7F6-B498-43B3-948B-1728B52AA6E4}">
-                <adec:decorative xmlns:adec="http://schemas.microsoft.com/office/drawing/2017/decorative" val="1"/>
-              </a:ext>
-            </a:extLst>
-          </p:cNvPr>
-          <p:cNvSpPr>
-            <a:spLocks noGrp="1" noRot="1" noChangeAspect="1" noMove="1" noResize="1" noEditPoints="1" noAdjustHandles="1" noChangeArrowheads="1" noChangeShapeType="1" noTextEdit="1"/>
-          </p:cNvSpPr>
-          <p:nvPr>
-            <p:extLst>
-              <p:ext uri="{386F3935-93C4-4BCD-93E2-E3B085C9AB24}">
-                <p16:designElem xmlns:p16="http://schemas.microsoft.com/office/powerpoint/2015/main" val="1"/>
-              </p:ext>
-            </p:extLst>
-          </p:nvPr>
-        </p:nvSpPr>
-        <p:spPr>
-          <a:xfrm>
-            <a:off x="4241830" y="457200"/>
-            <a:ext cx="3703320" cy="91440"/>
-          </a:xfrm>
-          <a:prstGeom prst="rect">
-            <a:avLst/>
-          </a:prstGeom>
-          <a:solidFill>
-            <a:schemeClr val="accent1"/>
-          </a:solidFill>
-          <a:ln>
-            <a:noFill/>
-          </a:ln>
-          <a:effectLst/>
-        </p:spPr>
-        <p:style>
-          <a:lnRef idx="1">
-            <a:schemeClr val="accent1"/>
-          </a:lnRef>
-          <a:fillRef idx="3">
-            <a:schemeClr val="accent1"/>
-          </a:fillRef>
-          <a:effectRef idx="2">
-            <a:schemeClr val="accent1"/>
-          </a:effectRef>
-          <a:fontRef idx="minor">
-            <a:schemeClr val="lt1"/>
-          </a:fontRef>
-        </p:style>
-        <p:txBody>
-          <a:bodyPr/>
-          <a:lstStyle/>
-          <a:p>
-            <a:pPr marL="0" marR="0" lvl="0" indent="0" algn="l" defTabSz="457200" rtl="0" eaLnBrk="1" fontAlgn="auto" latinLnBrk="0" hangingPunct="1">
-              <a:lnSpc>
-                <a:spcPct val="100000"/>
-              </a:lnSpc>
-              <a:spcBef>
-                <a:spcPts val="0"/>
-              </a:spcBef>
-              <a:spcAft>
-                <a:spcPts val="0"/>
-              </a:spcAft>
-              <a:buClrTx/>
-              <a:buSzTx/>
-              <a:buFontTx/>
-              <a:buNone/>
-              <a:tabLst/>
-              <a:defRPr/>
-            </a:pPr>
-            <a:endParaRPr kumimoji="0" lang="en-US" sz="1800" b="0" i="0" u="none" strike="noStrike" kern="1200" cap="none" spc="0" normalizeH="0" baseline="0" noProof="0">
-              <a:ln>
-                <a:noFill/>
-              </a:ln>
-              <a:solidFill>
-                <a:srgbClr val="FFFFFF"/>
-              </a:solidFill>
-              <a:effectLst/>
-              <a:uLnTx/>
-              <a:uFillTx/>
-              <a:latin typeface="Calibri"/>
-              <a:ea typeface="+mn-ea"/>
-              <a:cs typeface="+mn-cs"/>
-            </a:endParaRPr>
-          </a:p>
-        </p:txBody>
-      </p:sp>
-      <p:sp>
-        <p:nvSpPr>
-          <p:cNvPr id="61" name="Rectangle 60">
-            <a:extLst>
-              <a:ext uri="{FF2B5EF4-FFF2-40B4-BE49-F238E27FC236}">
-                <a16:creationId xmlns:a16="http://schemas.microsoft.com/office/drawing/2014/main" id="{7539E646-A625-4A26-86ED-BD90EDD329F7}"/>
-              </a:ext>
-              <a:ext uri="{C183D7F6-B498-43B3-948B-1728B52AA6E4}">
-                <adec:decorative xmlns:adec="http://schemas.microsoft.com/office/drawing/2017/decorative" val="1"/>
-              </a:ext>
-            </a:extLst>
-          </p:cNvPr>
-          <p:cNvSpPr>
-            <a:spLocks noGrp="1" noRot="1" noChangeAspect="1" noMove="1" noResize="1" noEditPoints="1" noAdjustHandles="1" noChangeArrowheads="1" noChangeShapeType="1" noTextEdit="1"/>
-          </p:cNvSpPr>
-          <p:nvPr>
-            <p:extLst>
-              <p:ext uri="{386F3935-93C4-4BCD-93E2-E3B085C9AB24}">
-                <p16:designElem xmlns:p16="http://schemas.microsoft.com/office/powerpoint/2015/main" val="1"/>
-              </p:ext>
-            </p:extLst>
-          </p:nvPr>
-        </p:nvSpPr>
-        <p:spPr>
-          <a:xfrm>
-            <a:off x="446534" y="3085764"/>
-            <a:ext cx="11298932" cy="3338149"/>
-          </a:xfrm>
-          <a:prstGeom prst="rect">
-            <a:avLst/>
-          </a:prstGeom>
-          <a:solidFill>
-            <a:srgbClr val="465359"/>
-          </a:solidFill>
-          <a:ln>
-            <a:noFill/>
-          </a:ln>
-          <a:effectLst/>
-        </p:spPr>
-        <p:style>
-          <a:lnRef idx="1">
-            <a:schemeClr val="accent1"/>
-          </a:lnRef>
-          <a:fillRef idx="3">
-            <a:schemeClr val="accent1"/>
-          </a:fillRef>
-          <a:effectRef idx="2">
-            <a:schemeClr val="accent1"/>
-          </a:effectRef>
-          <a:fontRef idx="minor">
-            <a:schemeClr val="lt1"/>
-          </a:fontRef>
-        </p:style>
-        <p:txBody>
-          <a:bodyPr/>
-          <a:lstStyle/>
-          <a:p>
-            <a:pPr marL="0" marR="0" lvl="0" indent="0" algn="l" defTabSz="457200" rtl="0" eaLnBrk="1" fontAlgn="auto" latinLnBrk="0" hangingPunct="1">
-              <a:lnSpc>
-                <a:spcPct val="100000"/>
-              </a:lnSpc>
-              <a:spcBef>
-                <a:spcPts val="0"/>
-              </a:spcBef>
-              <a:spcAft>
-                <a:spcPts val="0"/>
-              </a:spcAft>
-              <a:buClrTx/>
-              <a:buSzTx/>
-              <a:buFontTx/>
-              <a:buNone/>
-              <a:tabLst/>
-              <a:defRPr/>
-            </a:pPr>
-            <a:endParaRPr kumimoji="0" lang="en-US" sz="1800" b="0" i="0" u="none" strike="noStrike" kern="1200" cap="none" spc="0" normalizeH="0" baseline="0" noProof="0">
-              <a:ln>
-                <a:noFill/>
-              </a:ln>
-              <a:solidFill>
-                <a:srgbClr val="FFFFFF"/>
-              </a:solidFill>
-              <a:effectLst/>
-              <a:uLnTx/>
-              <a:uFillTx/>
-              <a:latin typeface="Calibri"/>
-              <a:ea typeface="+mn-ea"/>
-              <a:cs typeface="+mn-cs"/>
-            </a:endParaRPr>
-          </a:p>
-        </p:txBody>
-      </p:sp>
-      <p:sp useBgFill="1">
-        <p:nvSpPr>
-          <p:cNvPr id="63" name="Rectangle 62">
-            <a:extLst>
-              <a:ext uri="{FF2B5EF4-FFF2-40B4-BE49-F238E27FC236}">
-                <a16:creationId xmlns:a16="http://schemas.microsoft.com/office/drawing/2014/main" id="{9FE6175D-CE1B-4C8E-8FF8-7309F21F31C5}"/>
-              </a:ext>
-              <a:ext uri="{C183D7F6-B498-43B3-948B-1728B52AA6E4}">
-                <adec:decorative xmlns:adec="http://schemas.microsoft.com/office/drawing/2017/decorative" val="1"/>
-              </a:ext>
-            </a:extLst>
-          </p:cNvPr>
-          <p:cNvSpPr>
-            <a:spLocks noGrp="1" noRot="1" noChangeAspect="1" noMove="1" noResize="1" noEditPoints="1" noAdjustHandles="1" noChangeArrowheads="1" noChangeShapeType="1" noTextEdit="1"/>
-          </p:cNvSpPr>
-          <p:nvPr>
-            <p:extLst>
-              <p:ext uri="{386F3935-93C4-4BCD-93E2-E3B085C9AB24}">
-                <p16:designElem xmlns:p16="http://schemas.microsoft.com/office/powerpoint/2015/main" val="1"/>
-              </p:ext>
-            </p:extLst>
-          </p:nvPr>
-        </p:nvSpPr>
-        <p:spPr>
-          <a:xfrm>
-            <a:off x="0" y="0"/>
-            <a:ext cx="12192000" cy="6858000"/>
-          </a:xfrm>
-          <a:prstGeom prst="rect">
-            <a:avLst/>
-          </a:prstGeom>
-          <a:ln>
-            <a:noFill/>
-          </a:ln>
-        </p:spPr>
-        <p:style>
-          <a:lnRef idx="2">
-            <a:schemeClr val="accent1">
-              <a:shade val="50000"/>
-            </a:schemeClr>
-          </a:lnRef>
-          <a:fillRef idx="1">
-            <a:schemeClr val="accent1"/>
-          </a:fillRef>
-          <a:effectRef idx="0">
-            <a:schemeClr val="accent1"/>
-          </a:effectRef>
-          <a:fontRef idx="minor">
-            <a:schemeClr val="lt1"/>
-          </a:fontRef>
-        </p:style>
-        <p:txBody>
-          <a:bodyPr rtlCol="0" anchor="ctr"/>
-          <a:lstStyle/>
-          <a:p>
-            <a:pPr marL="0" marR="0" lvl="0" indent="0" algn="ctr" defTabSz="457200" rtl="0" eaLnBrk="1" fontAlgn="auto" latinLnBrk="0" hangingPunct="1">
-              <a:lnSpc>
-                <a:spcPct val="100000"/>
-              </a:lnSpc>
-              <a:spcBef>
-                <a:spcPts val="0"/>
-              </a:spcBef>
-              <a:spcAft>
-                <a:spcPts val="0"/>
-              </a:spcAft>
-              <a:buClrTx/>
-              <a:buSzTx/>
-              <a:buFontTx/>
-              <a:buNone/>
-              <a:tabLst/>
-              <a:defRPr/>
-            </a:pPr>
-            <a:endParaRPr kumimoji="0" lang="en-US" sz="1800" b="0" i="0" u="none" strike="noStrike" kern="1200" cap="none" spc="0" normalizeH="0" baseline="0" noProof="0">
-              <a:ln>
-                <a:noFill/>
-              </a:ln>
-              <a:solidFill>
-                <a:srgbClr val="FFFFFF"/>
-              </a:solidFill>
-              <a:effectLst/>
-              <a:uLnTx/>
-              <a:uFillTx/>
-              <a:latin typeface="Calibri"/>
-              <a:ea typeface="+mn-ea"/>
-              <a:cs typeface="+mn-cs"/>
-            </a:endParaRPr>
-          </a:p>
-        </p:txBody>
-      </p:sp>
-      <p:sp>
-        <p:nvSpPr>
-          <p:cNvPr id="2" name="Title 1">
-            <a:extLst>
-              <a:ext uri="{FF2B5EF4-FFF2-40B4-BE49-F238E27FC236}">
-                <a16:creationId xmlns:a16="http://schemas.microsoft.com/office/drawing/2014/main" id="{06E2D6A9-0F1B-4AF5-7E13-81A1ED31665A}"/>
-              </a:ext>
-            </a:extLst>
-          </p:cNvPr>
-          <p:cNvSpPr>
-            <a:spLocks noGrp="1"/>
-          </p:cNvSpPr>
-          <p:nvPr>
-            <p:ph type="title"/>
-          </p:nvPr>
-        </p:nvSpPr>
-        <p:spPr>
-          <a:xfrm>
-            <a:off x="4389121" y="863695"/>
-            <a:ext cx="7204036" cy="4947169"/>
-          </a:xfrm>
-        </p:spPr>
-        <p:txBody>
-          <a:bodyPr vert="horz" lIns="91440" tIns="45720" rIns="91440" bIns="45720" rtlCol="0" anchor="ctr">
-            <a:normAutofit/>
-          </a:bodyPr>
-          <a:lstStyle/>
-          <a:p>
-            <a:r>
-              <a:rPr lang="en-US" sz="4400" b="0" kern="1200" cap="all" dirty="0">
-                <a:solidFill>
-                  <a:schemeClr val="tx1">
-                    <a:lumMod val="85000"/>
-                    <a:lumOff val="15000"/>
-                  </a:schemeClr>
-                </a:solidFill>
-                <a:latin typeface="+mj-lt"/>
-                <a:ea typeface="+mj-ea"/>
-                <a:cs typeface="+mj-cs"/>
-              </a:rPr>
-              <a:t>2.2.1 task 1</a:t>
-            </a:r>
-          </a:p>
-        </p:txBody>
-      </p:sp>
-      <p:sp>
-        <p:nvSpPr>
-          <p:cNvPr id="65" name="Rectangle 64">
-            <a:extLst>
-              <a:ext uri="{FF2B5EF4-FFF2-40B4-BE49-F238E27FC236}">
-                <a16:creationId xmlns:a16="http://schemas.microsoft.com/office/drawing/2014/main" id="{0DF8C05A-3103-44B5-AFBC-A8FC5AF00AFD}"/>
-              </a:ext>
-              <a:ext uri="{C183D7F6-B498-43B3-948B-1728B52AA6E4}">
-                <adec:decorative xmlns:adec="http://schemas.microsoft.com/office/drawing/2017/decorative" val="1"/>
-              </a:ext>
-            </a:extLst>
-          </p:cNvPr>
-          <p:cNvSpPr>
-            <a:spLocks noGrp="1" noRot="1" noChangeAspect="1" noMove="1" noResize="1" noEditPoints="1" noAdjustHandles="1" noChangeArrowheads="1" noChangeShapeType="1" noTextEdit="1"/>
-          </p:cNvSpPr>
-          <p:nvPr>
-            <p:extLst>
-              <p:ext uri="{386F3935-93C4-4BCD-93E2-E3B085C9AB24}">
-                <p16:designElem xmlns:p16="http://schemas.microsoft.com/office/powerpoint/2015/main" val="1"/>
-              </p:ext>
-            </p:extLst>
-          </p:nvPr>
-        </p:nvSpPr>
-        <p:spPr>
-          <a:xfrm>
-            <a:off x="446534" y="457200"/>
-            <a:ext cx="3703320" cy="91440"/>
-          </a:xfrm>
-          <a:prstGeom prst="rect">
-            <a:avLst/>
-          </a:prstGeom>
-          <a:solidFill>
-            <a:schemeClr val="accent1"/>
-          </a:solidFill>
-          <a:ln>
-            <a:noFill/>
-          </a:ln>
-          <a:effectLst/>
-        </p:spPr>
-        <p:style>
-          <a:lnRef idx="1">
-            <a:schemeClr val="accent1"/>
-          </a:lnRef>
-          <a:fillRef idx="3">
-            <a:schemeClr val="accent1"/>
-          </a:fillRef>
-          <a:effectRef idx="2">
-            <a:schemeClr val="accent1"/>
-          </a:effectRef>
-          <a:fontRef idx="minor">
-            <a:schemeClr val="lt1"/>
-          </a:fontRef>
-        </p:style>
-        <p:txBody>
-          <a:bodyPr/>
-          <a:lstStyle/>
-          <a:p>
-            <a:pPr marL="0" marR="0" lvl="0" indent="0" algn="l" defTabSz="457200" rtl="0" eaLnBrk="1" fontAlgn="auto" latinLnBrk="0" hangingPunct="1">
-              <a:lnSpc>
-                <a:spcPct val="100000"/>
-              </a:lnSpc>
-              <a:spcBef>
-                <a:spcPts val="0"/>
-              </a:spcBef>
-              <a:spcAft>
-                <a:spcPts val="0"/>
-              </a:spcAft>
-              <a:buClrTx/>
-              <a:buSzTx/>
-              <a:buFontTx/>
-              <a:buNone/>
-              <a:tabLst/>
-              <a:defRPr/>
-            </a:pPr>
-            <a:endParaRPr kumimoji="0" lang="en-US" sz="1800" b="0" i="0" u="none" strike="noStrike" kern="1200" cap="none" spc="0" normalizeH="0" baseline="0" noProof="0">
-              <a:ln>
-                <a:noFill/>
-              </a:ln>
-              <a:solidFill>
-                <a:srgbClr val="FFFFFF"/>
-              </a:solidFill>
-              <a:effectLst/>
-              <a:uLnTx/>
-              <a:uFillTx/>
-              <a:latin typeface="Calibri"/>
-              <a:ea typeface="+mn-ea"/>
-              <a:cs typeface="+mn-cs"/>
-            </a:endParaRPr>
-          </a:p>
-        </p:txBody>
-      </p:sp>
-      <p:sp>
-        <p:nvSpPr>
-          <p:cNvPr id="67" name="Rectangle 66">
-            <a:extLst>
-              <a:ext uri="{FF2B5EF4-FFF2-40B4-BE49-F238E27FC236}">
-                <a16:creationId xmlns:a16="http://schemas.microsoft.com/office/drawing/2014/main" id="{0794EE00-AFAB-44F8-902F-E94445806663}"/>
-              </a:ext>
-              <a:ext uri="{C183D7F6-B498-43B3-948B-1728B52AA6E4}">
-                <adec:decorative xmlns:adec="http://schemas.microsoft.com/office/drawing/2017/decorative" val="1"/>
-              </a:ext>
-            </a:extLst>
-          </p:cNvPr>
-          <p:cNvSpPr>
-            <a:spLocks noGrp="1" noRot="1" noChangeAspect="1" noMove="1" noResize="1" noEditPoints="1" noAdjustHandles="1" noChangeArrowheads="1" noChangeShapeType="1" noTextEdit="1"/>
-          </p:cNvSpPr>
-          <p:nvPr>
-            <p:extLst>
-              <p:ext uri="{386F3935-93C4-4BCD-93E2-E3B085C9AB24}">
-                <p16:designElem xmlns:p16="http://schemas.microsoft.com/office/powerpoint/2015/main" val="1"/>
-              </p:ext>
-            </p:extLst>
-          </p:nvPr>
-        </p:nvSpPr>
-        <p:spPr>
-          <a:xfrm>
-            <a:off x="4241830" y="453643"/>
-            <a:ext cx="7503637" cy="94997"/>
-          </a:xfrm>
-          <a:prstGeom prst="rect">
-            <a:avLst/>
-          </a:prstGeom>
-          <a:solidFill>
-            <a:srgbClr val="465359"/>
-          </a:solidFill>
-          <a:ln>
-            <a:noFill/>
-          </a:ln>
-          <a:effectLst/>
-        </p:spPr>
-        <p:style>
-          <a:lnRef idx="1">
-            <a:schemeClr val="accent1"/>
-          </a:lnRef>
-          <a:fillRef idx="3">
-            <a:schemeClr val="accent1"/>
-          </a:fillRef>
-          <a:effectRef idx="2">
-            <a:schemeClr val="accent1"/>
-          </a:effectRef>
-          <a:fontRef idx="minor">
-            <a:schemeClr val="lt1"/>
-          </a:fontRef>
-        </p:style>
-        <p:txBody>
-          <a:bodyPr/>
-          <a:lstStyle/>
-          <a:p>
-            <a:pPr marL="0" marR="0" lvl="0" indent="0" algn="l" defTabSz="457200" rtl="0" eaLnBrk="1" fontAlgn="auto" latinLnBrk="0" hangingPunct="1">
-              <a:lnSpc>
-                <a:spcPct val="100000"/>
-              </a:lnSpc>
-              <a:spcBef>
-                <a:spcPts val="0"/>
-              </a:spcBef>
-              <a:spcAft>
-                <a:spcPts val="0"/>
-              </a:spcAft>
-              <a:buClrTx/>
-              <a:buSzTx/>
-              <a:buFontTx/>
-              <a:buNone/>
-              <a:tabLst/>
-              <a:defRPr/>
-            </a:pPr>
-            <a:endParaRPr kumimoji="0" lang="en-US" sz="1800" b="0" i="0" u="none" strike="noStrike" kern="1200" cap="none" spc="0" normalizeH="0" baseline="0" noProof="0">
-              <a:ln>
-                <a:noFill/>
-              </a:ln>
-              <a:solidFill>
-                <a:srgbClr val="FFFFFF"/>
-              </a:solidFill>
-              <a:effectLst/>
-              <a:uLnTx/>
-              <a:uFillTx/>
-              <a:latin typeface="Calibri"/>
-              <a:ea typeface="+mn-ea"/>
-              <a:cs typeface="+mn-cs"/>
-            </a:endParaRPr>
-          </a:p>
-        </p:txBody>
-      </p:sp>
-      <p:sp>
-        <p:nvSpPr>
-          <p:cNvPr id="69" name="Rectangle 68">
-            <a:extLst>
-              <a:ext uri="{FF2B5EF4-FFF2-40B4-BE49-F238E27FC236}">
-                <a16:creationId xmlns:a16="http://schemas.microsoft.com/office/drawing/2014/main" id="{95F12ABC-29DF-4D0F-9FE7-873B7F8E32DC}"/>
-              </a:ext>
-              <a:ext uri="{C183D7F6-B498-43B3-948B-1728B52AA6E4}">
-                <adec:decorative xmlns:adec="http://schemas.microsoft.com/office/drawing/2017/decorative" val="1"/>
-              </a:ext>
-            </a:extLst>
-          </p:cNvPr>
-          <p:cNvSpPr>
-            <a:spLocks noGrp="1" noRot="1" noChangeAspect="1" noMove="1" noResize="1" noEditPoints="1" noAdjustHandles="1" noChangeArrowheads="1" noChangeShapeType="1" noTextEdit="1"/>
-          </p:cNvSpPr>
-          <p:nvPr>
-            <p:extLst>
-              <p:ext uri="{386F3935-93C4-4BCD-93E2-E3B085C9AB24}">
-                <p16:designElem xmlns:p16="http://schemas.microsoft.com/office/powerpoint/2015/main" val="1"/>
-              </p:ext>
-            </p:extLst>
-          </p:nvPr>
-        </p:nvSpPr>
-        <p:spPr>
-          <a:xfrm>
-            <a:off x="446534" y="614044"/>
-            <a:ext cx="3703320" cy="5745836"/>
-          </a:xfrm>
-          <a:prstGeom prst="rect">
-            <a:avLst/>
-          </a:prstGeom>
-          <a:solidFill>
-            <a:schemeClr val="accent1"/>
-          </a:solidFill>
-          <a:ln>
-            <a:noFill/>
-          </a:ln>
-          <a:effectLst/>
-        </p:spPr>
-        <p:style>
-          <a:lnRef idx="1">
-            <a:schemeClr val="accent1"/>
-          </a:lnRef>
-          <a:fillRef idx="3">
-            <a:schemeClr val="accent1"/>
-          </a:fillRef>
-          <a:effectRef idx="2">
-            <a:schemeClr val="accent1"/>
-          </a:effectRef>
-          <a:fontRef idx="minor">
-            <a:schemeClr val="lt1"/>
-          </a:fontRef>
-        </p:style>
-        <p:txBody>
-          <a:bodyPr/>
-          <a:lstStyle/>
-          <a:p>
-            <a:pPr marL="0" marR="0" lvl="0" indent="0" algn="l" defTabSz="457200" rtl="0" eaLnBrk="1" fontAlgn="auto" latinLnBrk="0" hangingPunct="1">
-              <a:lnSpc>
-                <a:spcPct val="100000"/>
-              </a:lnSpc>
-              <a:spcBef>
-                <a:spcPts val="0"/>
-              </a:spcBef>
-              <a:spcAft>
-                <a:spcPts val="0"/>
-              </a:spcAft>
-              <a:buClrTx/>
-              <a:buSzTx/>
-              <a:buFontTx/>
-              <a:buNone/>
-              <a:tabLst/>
-              <a:defRPr/>
-            </a:pPr>
-            <a:endParaRPr kumimoji="0" lang="en-US" sz="1800" b="0" i="0" u="none" strike="noStrike" kern="1200" cap="none" spc="0" normalizeH="0" baseline="0" noProof="0">
-              <a:ln>
-                <a:noFill/>
-              </a:ln>
-              <a:solidFill>
-                <a:srgbClr val="FFFFFF"/>
-              </a:solidFill>
-              <a:effectLst/>
-              <a:uLnTx/>
-              <a:uFillTx/>
-              <a:latin typeface="Calibri"/>
-              <a:ea typeface="+mn-ea"/>
-              <a:cs typeface="+mn-cs"/>
-            </a:endParaRPr>
-          </a:p>
-        </p:txBody>
-      </p:sp>
-    </p:spTree>
-    <p:extLst>
-      <p:ext uri="{BB962C8B-B14F-4D97-AF65-F5344CB8AC3E}">
-        <p14:creationId xmlns:p14="http://schemas.microsoft.com/office/powerpoint/2010/main" val="1783749850"/>
-      </p:ext>
-    </p:extLst>
-  </p:cSld>
-  <p:clrMapOvr>
-    <a:masterClrMapping/>
-  </p:clrMapOvr>
-</p:sld>
-</file>
-
-<file path=ppt/slides/slide23.xml><?xml version="1.0" encoding="utf-8"?>
-<p:sld xmlns:a="http://schemas.openxmlformats.org/drawingml/2006/main" xmlns:r="http://schemas.openxmlformats.org/officeDocument/2006/relationships" xmlns:p="http://schemas.openxmlformats.org/presentationml/2006/main">
-  <p:cSld>
-    <p:spTree>
-      <p:nvGrpSpPr>
-        <p:cNvPr id="1" name=""/>
-        <p:cNvGrpSpPr/>
-        <p:nvPr/>
-      </p:nvGrpSpPr>
-      <p:grpSpPr>
-        <a:xfrm>
-          <a:off x="0" y="0"/>
-          <a:ext cx="0" cy="0"/>
-          <a:chOff x="0" y="0"/>
-          <a:chExt cx="0" cy="0"/>
-        </a:xfrm>
-      </p:grpSpPr>
-      <p:sp>
-        <p:nvSpPr>
-          <p:cNvPr id="2" name="Title 1">
-            <a:extLst>
-              <a:ext uri="{FF2B5EF4-FFF2-40B4-BE49-F238E27FC236}">
-                <a16:creationId xmlns:a16="http://schemas.microsoft.com/office/drawing/2014/main" id="{DBB91409-4B0B-F6CA-8AC4-A09AC9277A2E}"/>
-              </a:ext>
-            </a:extLst>
-          </p:cNvPr>
-          <p:cNvSpPr>
-            <a:spLocks noGrp="1"/>
-          </p:cNvSpPr>
-          <p:nvPr>
-            <p:ph type="title"/>
-          </p:nvPr>
-        </p:nvSpPr>
-        <p:spPr>
-          <a:xfrm>
-            <a:off x="581192" y="702156"/>
-            <a:ext cx="11029616" cy="660300"/>
-          </a:xfrm>
-        </p:spPr>
-        <p:txBody>
-          <a:bodyPr/>
-          <a:lstStyle/>
-          <a:p>
-            <a:r>
-              <a:rPr lang="en-US" dirty="0"/>
-              <a:t>Confidence interval</a:t>
-            </a:r>
-          </a:p>
-        </p:txBody>
-      </p:sp>
-    </p:spTree>
-    <p:extLst>
-      <p:ext uri="{BB962C8B-B14F-4D97-AF65-F5344CB8AC3E}">
-        <p14:creationId xmlns:p14="http://schemas.microsoft.com/office/powerpoint/2010/main" val="1337307238"/>
       </p:ext>
     </p:extLst>
   </p:cSld>

</xml_diff>